<commit_message>
Updated the project plan slides.
</commit_message>
<xml_diff>
--- a/Administrative/Project Plan Slides.pptx
+++ b/Administrative/Project Plan Slides.pptx
@@ -5,7 +5,7 @@
     <p:sldMasterId id="2147483675" r:id="rId1"/>
   </p:sldMasterIdLst>
   <p:notesMasterIdLst>
-    <p:notesMasterId r:id="rId17"/>
+    <p:notesMasterId r:id="rId19"/>
   </p:notesMasterIdLst>
   <p:sldIdLst>
     <p:sldId id="257" r:id="rId2"/>
@@ -13,8 +13,8 @@
     <p:sldId id="259" r:id="rId4"/>
     <p:sldId id="260" r:id="rId5"/>
     <p:sldId id="261" r:id="rId6"/>
-    <p:sldId id="262" r:id="rId7"/>
-    <p:sldId id="263" r:id="rId8"/>
+    <p:sldId id="263" r:id="rId7"/>
+    <p:sldId id="262" r:id="rId8"/>
     <p:sldId id="264" r:id="rId9"/>
     <p:sldId id="265" r:id="rId10"/>
     <p:sldId id="266" r:id="rId11"/>
@@ -22,7 +22,9 @@
     <p:sldId id="268" r:id="rId13"/>
     <p:sldId id="269" r:id="rId14"/>
     <p:sldId id="270" r:id="rId15"/>
-    <p:sldId id="271" r:id="rId16"/>
+    <p:sldId id="272" r:id="rId16"/>
+    <p:sldId id="273" r:id="rId17"/>
+    <p:sldId id="271" r:id="rId18"/>
   </p:sldIdLst>
   <p:sldSz cx="9144000" cy="6858000" type="screen4x3"/>
   <p:notesSz cx="7315200" cy="9601200"/>
@@ -4629,11 +4631,7 @@
           <a:p>
             <a:r>
               <a:rPr lang="fi-FI" dirty="0" smtClean="0"/>
-              <a:t>Joni-Matti </a:t>
-            </a:r>
-            <a:r>
-              <a:rPr lang="fi-FI" dirty="0" smtClean="0"/>
-              <a:t>Määttä, </a:t>
+              <a:t>Joni-Matti Määttä, </a:t>
             </a:r>
             <a:r>
               <a:rPr lang="fi-FI" smtClean="0"/>
@@ -5604,8 +5602,178 @@
           <a:lstStyle/>
           <a:p>
             <a:r>
-              <a:rPr lang="fi-FI" dirty="0" err="1" smtClean="0"/>
-              <a:t>Conclusion</a:t>
+              <a:rPr lang="fi-FI" dirty="0" smtClean="0"/>
+              <a:t>SWOT</a:t>
+            </a:r>
+            <a:endParaRPr lang="en-US" dirty="0"/>
+          </a:p>
+        </p:txBody>
+      </p:sp>
+      <p:sp>
+        <p:nvSpPr>
+          <p:cNvPr id="6" name="Content Placeholder 5"/>
+          <p:cNvSpPr>
+            <a:spLocks noGrp="1"/>
+          </p:cNvSpPr>
+          <p:nvPr>
+            <p:ph idx="1"/>
+          </p:nvPr>
+        </p:nvSpPr>
+        <p:spPr/>
+        <p:txBody>
+          <a:bodyPr>
+            <a:normAutofit lnSpcReduction="10000"/>
+          </a:bodyPr>
+          <a:lstStyle/>
+          <a:p>
+            <a:r>
+              <a:rPr lang="en-US" dirty="0" smtClean="0"/>
+              <a:t>Strengths</a:t>
+            </a:r>
+          </a:p>
+          <a:p>
+            <a:pPr lvl="1"/>
+            <a:r>
+              <a:rPr lang="en-US" dirty="0"/>
+              <a:t>The project topic is quite simple and does not require too much special </a:t>
+            </a:r>
+            <a:r>
+              <a:rPr lang="en-US" dirty="0" smtClean="0"/>
+              <a:t>skills</a:t>
+            </a:r>
+          </a:p>
+          <a:p>
+            <a:pPr lvl="1"/>
+            <a:r>
+              <a:rPr lang="en-US" dirty="0"/>
+              <a:t>All members have experience in C</a:t>
+            </a:r>
+            <a:r>
+              <a:rPr lang="en-US" dirty="0" smtClean="0"/>
+              <a:t>++</a:t>
+            </a:r>
+          </a:p>
+          <a:p>
+            <a:pPr lvl="1"/>
+            <a:r>
+              <a:rPr lang="en-US" dirty="0"/>
+              <a:t>Joni-</a:t>
+            </a:r>
+            <a:r>
+              <a:rPr lang="en-US" dirty="0" err="1"/>
+              <a:t>Matti</a:t>
+            </a:r>
+            <a:r>
+              <a:rPr lang="en-US" dirty="0"/>
+              <a:t> has experience in other projects and project </a:t>
+            </a:r>
+            <a:r>
+              <a:rPr lang="en-US" dirty="0" smtClean="0"/>
+              <a:t>management</a:t>
+            </a:r>
+          </a:p>
+          <a:p>
+            <a:r>
+              <a:rPr lang="en-US" dirty="0" smtClean="0"/>
+              <a:t>Weaknesses</a:t>
+            </a:r>
+          </a:p>
+          <a:p>
+            <a:pPr lvl="1"/>
+            <a:r>
+              <a:rPr lang="en-US" dirty="0"/>
+              <a:t>Two members of the project group have only basic experience in </a:t>
+            </a:r>
+            <a:r>
+              <a:rPr lang="en-US" dirty="0" err="1" smtClean="0"/>
+              <a:t>Qt</a:t>
+            </a:r>
+            <a:endParaRPr lang="en-US" dirty="0"/>
+          </a:p>
+        </p:txBody>
+      </p:sp>
+      <p:sp>
+        <p:nvSpPr>
+          <p:cNvPr id="4" name="Slide Number Placeholder 3"/>
+          <p:cNvSpPr>
+            <a:spLocks noGrp="1"/>
+          </p:cNvSpPr>
+          <p:nvPr>
+            <p:ph type="sldNum" sz="quarter" idx="11"/>
+          </p:nvPr>
+        </p:nvSpPr>
+        <p:spPr/>
+        <p:txBody>
+          <a:bodyPr/>
+          <a:lstStyle/>
+          <a:p>
+            <a:fld id="{396A2528-BFCE-4DA1-8CA6-E7CCE78C7A79}" type="slidenum">
+              <a:rPr lang="fi-FI" smtClean="0"/>
+              <a:pPr/>
+              <a:t>15</a:t>
+            </a:fld>
+            <a:endParaRPr lang="fi-FI" dirty="0"/>
+          </a:p>
+        </p:txBody>
+      </p:sp>
+    </p:spTree>
+    <p:extLst>
+      <p:ext uri="{BB962C8B-B14F-4D97-AF65-F5344CB8AC3E}">
+        <p14:creationId xmlns:p14="http://schemas.microsoft.com/office/powerpoint/2010/main" val="3134423524"/>
+      </p:ext>
+    </p:extLst>
+  </p:cSld>
+  <p:clrMapOvr>
+    <a:masterClrMapping/>
+  </p:clrMapOvr>
+  <p:transition>
+    <p:zoom/>
+  </p:transition>
+  <p:timing>
+    <p:tnLst>
+      <p:par>
+        <p:cTn id="1" dur="indefinite" restart="never" nodeType="tmRoot"/>
+      </p:par>
+    </p:tnLst>
+  </p:timing>
+</p:sld>
+</file>
+
+<file path=ppt/slides/slide16.xml><?xml version="1.0" encoding="utf-8"?>
+<p:sld xmlns:a="http://schemas.openxmlformats.org/drawingml/2006/main" xmlns:r="http://schemas.openxmlformats.org/officeDocument/2006/relationships" xmlns:p="http://schemas.openxmlformats.org/presentationml/2006/main">
+  <p:cSld>
+    <p:spTree>
+      <p:nvGrpSpPr>
+        <p:cNvPr id="1" name=""/>
+        <p:cNvGrpSpPr/>
+        <p:nvPr/>
+      </p:nvGrpSpPr>
+      <p:grpSpPr>
+        <a:xfrm>
+          <a:off x="0" y="0"/>
+          <a:ext cx="0" cy="0"/>
+          <a:chOff x="0" y="0"/>
+          <a:chExt cx="0" cy="0"/>
+        </a:xfrm>
+      </p:grpSpPr>
+      <p:sp>
+        <p:nvSpPr>
+          <p:cNvPr id="5" name="Title 4"/>
+          <p:cNvSpPr>
+            <a:spLocks noGrp="1"/>
+          </p:cNvSpPr>
+          <p:nvPr>
+            <p:ph type="title"/>
+          </p:nvPr>
+        </p:nvSpPr>
+        <p:spPr/>
+        <p:txBody>
+          <a:bodyPr/>
+          <a:lstStyle/>
+          <a:p>
+            <a:r>
+              <a:rPr lang="fi-FI" dirty="0" smtClean="0"/>
+              <a:t>SWOT 2</a:t>
             </a:r>
             <a:endParaRPr lang="en-US" dirty="0"/>
           </a:p>
@@ -5629,47 +5797,55 @@
           <a:lstStyle/>
           <a:p>
             <a:r>
+              <a:rPr lang="en-US" dirty="0" smtClean="0"/>
+              <a:t>Opportunities</a:t>
+            </a:r>
+          </a:p>
+          <a:p>
+            <a:pPr lvl="1"/>
+            <a:r>
               <a:rPr lang="en-US" dirty="0"/>
-              <a:t>The project has a strict scope</a:t>
+              <a:t>All team members learn new skills in project management and </a:t>
+            </a:r>
+            <a:r>
+              <a:rPr lang="en-US" dirty="0" err="1"/>
+              <a:t>Qt</a:t>
+            </a:r>
+            <a:r>
+              <a:rPr lang="en-US" dirty="0"/>
+              <a:t> development</a:t>
             </a:r>
           </a:p>
           <a:p>
             <a:pPr lvl="1"/>
             <a:r>
               <a:rPr lang="en-US" dirty="0"/>
-              <a:t>Good chances to get everything done in schedule</a:t>
-            </a:r>
-          </a:p>
-          <a:p>
+              <a:t>If Kactus2 becomes popular, the dependency analysis tool will be well-known and used by many</a:t>
+            </a:r>
+          </a:p>
+          <a:p>
+            <a:r>
+              <a:rPr lang="en-US" dirty="0" smtClean="0"/>
+              <a:t>Threats</a:t>
+            </a:r>
+          </a:p>
+          <a:p>
+            <a:pPr lvl="1"/>
             <a:r>
               <a:rPr lang="en-US" dirty="0"/>
-              <a:t>All members have enough skills to accomplish tasks</a:t>
-            </a:r>
-          </a:p>
-          <a:p>
-            <a:pPr lvl="1"/>
+              <a:t>Joni-</a:t>
+            </a:r>
+            <a:r>
+              <a:rPr lang="en-US" dirty="0" err="1"/>
+              <a:t>Matti</a:t>
+            </a:r>
             <a:r>
               <a:rPr lang="en-US" dirty="0"/>
-              <a:t>Large-scale learning not required during the project</a:t>
-            </a:r>
-          </a:p>
-          <a:p>
-            <a:r>
-              <a:rPr lang="en-US" dirty="0"/>
-              <a:t>The project results are immediately taken into use in </a:t>
-            </a:r>
-            <a:r>
-              <a:rPr lang="en-US" dirty="0" smtClean="0"/>
-              <a:t>Kactus2</a:t>
-            </a:r>
-          </a:p>
-          <a:p>
-            <a:pPr lvl="1"/>
-            <a:r>
-              <a:rPr lang="en-US" dirty="0" smtClean="0"/>
-              <a:t>Direct benefits for the community</a:t>
-            </a:r>
-            <a:endParaRPr lang="en-US" dirty="0"/>
+              <a:t> has multiple ongoing projects at the moment</a:t>
+            </a:r>
+            <a:endParaRPr lang="en-US" dirty="0">
+              <a:effectLst/>
+            </a:endParaRPr>
           </a:p>
         </p:txBody>
       </p:sp>
@@ -5691,7 +5867,156 @@
             <a:fld id="{396A2528-BFCE-4DA1-8CA6-E7CCE78C7A79}" type="slidenum">
               <a:rPr lang="fi-FI" smtClean="0"/>
               <a:pPr/>
-              <a:t>15</a:t>
+              <a:t>16</a:t>
+            </a:fld>
+            <a:endParaRPr lang="fi-FI" dirty="0"/>
+          </a:p>
+        </p:txBody>
+      </p:sp>
+    </p:spTree>
+    <p:extLst>
+      <p:ext uri="{BB962C8B-B14F-4D97-AF65-F5344CB8AC3E}">
+        <p14:creationId xmlns:p14="http://schemas.microsoft.com/office/powerpoint/2010/main" val="2406581266"/>
+      </p:ext>
+    </p:extLst>
+  </p:cSld>
+  <p:clrMapOvr>
+    <a:masterClrMapping/>
+  </p:clrMapOvr>
+  <p:transition>
+    <p:zoom/>
+  </p:transition>
+  <p:timing>
+    <p:tnLst>
+      <p:par>
+        <p:cTn id="1" dur="indefinite" restart="never" nodeType="tmRoot"/>
+      </p:par>
+    </p:tnLst>
+  </p:timing>
+</p:sld>
+</file>
+
+<file path=ppt/slides/slide17.xml><?xml version="1.0" encoding="utf-8"?>
+<p:sld xmlns:a="http://schemas.openxmlformats.org/drawingml/2006/main" xmlns:r="http://schemas.openxmlformats.org/officeDocument/2006/relationships" xmlns:p="http://schemas.openxmlformats.org/presentationml/2006/main">
+  <p:cSld>
+    <p:spTree>
+      <p:nvGrpSpPr>
+        <p:cNvPr id="1" name=""/>
+        <p:cNvGrpSpPr/>
+        <p:nvPr/>
+      </p:nvGrpSpPr>
+      <p:grpSpPr>
+        <a:xfrm>
+          <a:off x="0" y="0"/>
+          <a:ext cx="0" cy="0"/>
+          <a:chOff x="0" y="0"/>
+          <a:chExt cx="0" cy="0"/>
+        </a:xfrm>
+      </p:grpSpPr>
+      <p:sp>
+        <p:nvSpPr>
+          <p:cNvPr id="5" name="Title 4"/>
+          <p:cNvSpPr>
+            <a:spLocks noGrp="1"/>
+          </p:cNvSpPr>
+          <p:nvPr>
+            <p:ph type="title"/>
+          </p:nvPr>
+        </p:nvSpPr>
+        <p:spPr/>
+        <p:txBody>
+          <a:bodyPr/>
+          <a:lstStyle/>
+          <a:p>
+            <a:r>
+              <a:rPr lang="fi-FI" dirty="0" err="1" smtClean="0"/>
+              <a:t>Conclusion</a:t>
+            </a:r>
+            <a:endParaRPr lang="en-US" dirty="0"/>
+          </a:p>
+        </p:txBody>
+      </p:sp>
+      <p:sp>
+        <p:nvSpPr>
+          <p:cNvPr id="6" name="Content Placeholder 5"/>
+          <p:cNvSpPr>
+            <a:spLocks noGrp="1"/>
+          </p:cNvSpPr>
+          <p:nvPr>
+            <p:ph idx="1"/>
+          </p:nvPr>
+        </p:nvSpPr>
+        <p:spPr/>
+        <p:txBody>
+          <a:bodyPr>
+            <a:normAutofit fontScale="92500" lnSpcReduction="10000"/>
+          </a:bodyPr>
+          <a:lstStyle/>
+          <a:p>
+            <a:r>
+              <a:rPr lang="en-US" dirty="0"/>
+              <a:t>The project has a strict scope</a:t>
+            </a:r>
+          </a:p>
+          <a:p>
+            <a:pPr lvl="1"/>
+            <a:r>
+              <a:rPr lang="en-US" dirty="0"/>
+              <a:t>Good chances to get everything done in schedule</a:t>
+            </a:r>
+          </a:p>
+          <a:p>
+            <a:r>
+              <a:rPr lang="en-US" dirty="0"/>
+              <a:t>All members have enough skills to accomplish tasks</a:t>
+            </a:r>
+          </a:p>
+          <a:p>
+            <a:pPr lvl="1"/>
+            <a:r>
+              <a:rPr lang="en-US" dirty="0"/>
+              <a:t>Large-scale learning not required during the project</a:t>
+            </a:r>
+          </a:p>
+          <a:p>
+            <a:r>
+              <a:rPr lang="en-US" dirty="0"/>
+              <a:t>The project results are immediately taken into use in </a:t>
+            </a:r>
+            <a:r>
+              <a:rPr lang="en-US" dirty="0" smtClean="0"/>
+              <a:t>Kactus2</a:t>
+            </a:r>
+          </a:p>
+          <a:p>
+            <a:pPr lvl="1"/>
+            <a:r>
+              <a:rPr lang="en-US" dirty="0" smtClean="0"/>
+              <a:t>Direct benefits for the community</a:t>
+            </a:r>
+            <a:endParaRPr lang="en-US" dirty="0"/>
+          </a:p>
+        </p:txBody>
+      </p:sp>
+      <p:sp>
+        <p:nvSpPr>
+          <p:cNvPr id="4" name="Slide Number Placeholder 3"/>
+          <p:cNvSpPr>
+            <a:spLocks noGrp="1"/>
+          </p:cNvSpPr>
+          <p:nvPr>
+            <p:ph type="sldNum" sz="quarter" idx="11"/>
+          </p:nvPr>
+        </p:nvSpPr>
+        <p:spPr/>
+        <p:txBody>
+          <a:bodyPr/>
+          <a:lstStyle/>
+          <a:p>
+            <a:fld id="{396A2528-BFCE-4DA1-8CA6-E7CCE78C7A79}" type="slidenum">
+              <a:rPr lang="fi-FI" smtClean="0"/>
+              <a:pPr/>
+              <a:t>17</a:t>
             </a:fld>
             <a:endParaRPr lang="fi-FI" dirty="0"/>
           </a:p>
@@ -6491,7 +6816,11 @@
             </a:r>
             <a:r>
               <a:rPr lang="fi-FI" sz="3600" dirty="0" smtClean="0"/>
-              <a:t>: UI</a:t>
+              <a:t>: </a:t>
+            </a:r>
+            <a:r>
+              <a:rPr lang="fi-FI" sz="3600" dirty="0" err="1" smtClean="0"/>
+              <a:t>Features</a:t>
             </a:r>
             <a:endParaRPr lang="en-US" sz="3600" dirty="0"/>
           </a:p>
@@ -6514,6 +6843,44 @@
           </a:bodyPr>
           <a:lstStyle/>
           <a:p>
+            <a:r>
+              <a:rPr lang="en-US" dirty="0"/>
+              <a:t>Choosing and Managing Source Directories</a:t>
+            </a:r>
+          </a:p>
+          <a:p>
+            <a:r>
+              <a:rPr lang="en-US" dirty="0"/>
+              <a:t>Running Dependency Analysis</a:t>
+            </a:r>
+          </a:p>
+          <a:p>
+            <a:r>
+              <a:rPr lang="en-US" dirty="0"/>
+              <a:t>Manual Connections</a:t>
+            </a:r>
+          </a:p>
+          <a:p>
+            <a:r>
+              <a:rPr lang="en-US" dirty="0"/>
+              <a:t>Editing Existing Connections</a:t>
+            </a:r>
+          </a:p>
+          <a:p>
+            <a:r>
+              <a:rPr lang="en-US" dirty="0"/>
+              <a:t>Filtering Connections</a:t>
+            </a:r>
+          </a:p>
+          <a:p>
+            <a:r>
+              <a:rPr lang="en-US" dirty="0"/>
+              <a:t>External </a:t>
+            </a:r>
+            <a:r>
+              <a:rPr lang="en-US" dirty="0" smtClean="0"/>
+              <a:t>Dependencies</a:t>
+            </a:r>
             <a:endParaRPr lang="en-US" dirty="0"/>
           </a:p>
         </p:txBody>
@@ -6537,6 +6904,126 @@
               <a:rPr lang="fi-FI" smtClean="0"/>
               <a:pPr/>
               <a:t>6</a:t>
+            </a:fld>
+            <a:endParaRPr lang="fi-FI" dirty="0"/>
+          </a:p>
+        </p:txBody>
+      </p:sp>
+    </p:spTree>
+    <p:extLst>
+      <p:ext uri="{BB962C8B-B14F-4D97-AF65-F5344CB8AC3E}">
+        <p14:creationId xmlns:p14="http://schemas.microsoft.com/office/powerpoint/2010/main" val="1194647921"/>
+      </p:ext>
+    </p:extLst>
+  </p:cSld>
+  <p:clrMapOvr>
+    <a:masterClrMapping/>
+  </p:clrMapOvr>
+  <p:transition>
+    <p:zoom/>
+  </p:transition>
+  <p:timing>
+    <p:tnLst>
+      <p:par>
+        <p:cTn id="1" dur="indefinite" restart="never" nodeType="tmRoot"/>
+      </p:par>
+    </p:tnLst>
+  </p:timing>
+</p:sld>
+</file>
+
+<file path=ppt/slides/slide7.xml><?xml version="1.0" encoding="utf-8"?>
+<p:sld xmlns:a="http://schemas.openxmlformats.org/drawingml/2006/main" xmlns:r="http://schemas.openxmlformats.org/officeDocument/2006/relationships" xmlns:p="http://schemas.openxmlformats.org/presentationml/2006/main">
+  <p:cSld>
+    <p:spTree>
+      <p:nvGrpSpPr>
+        <p:cNvPr id="1" name=""/>
+        <p:cNvGrpSpPr/>
+        <p:nvPr/>
+      </p:nvGrpSpPr>
+      <p:grpSpPr>
+        <a:xfrm>
+          <a:off x="0" y="0"/>
+          <a:ext cx="0" cy="0"/>
+          <a:chOff x="0" y="0"/>
+          <a:chExt cx="0" cy="0"/>
+        </a:xfrm>
+      </p:grpSpPr>
+      <p:sp>
+        <p:nvSpPr>
+          <p:cNvPr id="5" name="Title 4"/>
+          <p:cNvSpPr>
+            <a:spLocks noGrp="1"/>
+          </p:cNvSpPr>
+          <p:nvPr>
+            <p:ph type="title"/>
+          </p:nvPr>
+        </p:nvSpPr>
+        <p:spPr/>
+        <p:txBody>
+          <a:bodyPr/>
+          <a:lstStyle/>
+          <a:p>
+            <a:r>
+              <a:rPr lang="fi-FI" sz="3600" dirty="0" err="1" smtClean="0"/>
+              <a:t>Dependency</a:t>
+            </a:r>
+            <a:r>
+              <a:rPr lang="fi-FI" sz="3600" dirty="0" smtClean="0"/>
+              <a:t> Analysis </a:t>
+            </a:r>
+            <a:r>
+              <a:rPr lang="fi-FI" sz="3600" dirty="0" err="1" smtClean="0"/>
+              <a:t>Tool</a:t>
+            </a:r>
+            <a:r>
+              <a:rPr lang="fi-FI" sz="3600" dirty="0" smtClean="0"/>
+              <a:t>: UI</a:t>
+            </a:r>
+            <a:endParaRPr lang="en-US" sz="3600" dirty="0"/>
+          </a:p>
+        </p:txBody>
+      </p:sp>
+      <p:sp>
+        <p:nvSpPr>
+          <p:cNvPr id="6" name="Content Placeholder 5"/>
+          <p:cNvSpPr>
+            <a:spLocks noGrp="1"/>
+          </p:cNvSpPr>
+          <p:nvPr>
+            <p:ph idx="1"/>
+          </p:nvPr>
+        </p:nvSpPr>
+        <p:spPr/>
+        <p:txBody>
+          <a:bodyPr>
+            <a:normAutofit/>
+          </a:bodyPr>
+          <a:lstStyle/>
+          <a:p>
+            <a:endParaRPr lang="en-US" dirty="0"/>
+          </a:p>
+        </p:txBody>
+      </p:sp>
+      <p:sp>
+        <p:nvSpPr>
+          <p:cNvPr id="4" name="Slide Number Placeholder 3"/>
+          <p:cNvSpPr>
+            <a:spLocks noGrp="1"/>
+          </p:cNvSpPr>
+          <p:nvPr>
+            <p:ph type="sldNum" sz="quarter" idx="11"/>
+          </p:nvPr>
+        </p:nvSpPr>
+        <p:spPr/>
+        <p:txBody>
+          <a:bodyPr/>
+          <a:lstStyle/>
+          <a:p>
+            <a:fld id="{396A2528-BFCE-4DA1-8CA6-E7CCE78C7A79}" type="slidenum">
+              <a:rPr lang="fi-FI" smtClean="0"/>
+              <a:pPr/>
+              <a:t>7</a:t>
             </a:fld>
             <a:endParaRPr lang="fi-FI" dirty="0"/>
           </a:p>
@@ -6610,169 +7097,6 @@
     <p:extLst>
       <p:ext uri="{BB962C8B-B14F-4D97-AF65-F5344CB8AC3E}">
         <p14:creationId xmlns:p14="http://schemas.microsoft.com/office/powerpoint/2010/main" val="2661365691"/>
-      </p:ext>
-    </p:extLst>
-  </p:cSld>
-  <p:clrMapOvr>
-    <a:masterClrMapping/>
-  </p:clrMapOvr>
-  <p:transition>
-    <p:zoom/>
-  </p:transition>
-  <p:timing>
-    <p:tnLst>
-      <p:par>
-        <p:cTn id="1" dur="indefinite" restart="never" nodeType="tmRoot"/>
-      </p:par>
-    </p:tnLst>
-  </p:timing>
-</p:sld>
-</file>
-
-<file path=ppt/slides/slide7.xml><?xml version="1.0" encoding="utf-8"?>
-<p:sld xmlns:a="http://schemas.openxmlformats.org/drawingml/2006/main" xmlns:r="http://schemas.openxmlformats.org/officeDocument/2006/relationships" xmlns:p="http://schemas.openxmlformats.org/presentationml/2006/main">
-  <p:cSld>
-    <p:spTree>
-      <p:nvGrpSpPr>
-        <p:cNvPr id="1" name=""/>
-        <p:cNvGrpSpPr/>
-        <p:nvPr/>
-      </p:nvGrpSpPr>
-      <p:grpSpPr>
-        <a:xfrm>
-          <a:off x="0" y="0"/>
-          <a:ext cx="0" cy="0"/>
-          <a:chOff x="0" y="0"/>
-          <a:chExt cx="0" cy="0"/>
-        </a:xfrm>
-      </p:grpSpPr>
-      <p:sp>
-        <p:nvSpPr>
-          <p:cNvPr id="5" name="Title 4"/>
-          <p:cNvSpPr>
-            <a:spLocks noGrp="1"/>
-          </p:cNvSpPr>
-          <p:nvPr>
-            <p:ph type="title"/>
-          </p:nvPr>
-        </p:nvSpPr>
-        <p:spPr/>
-        <p:txBody>
-          <a:bodyPr/>
-          <a:lstStyle/>
-          <a:p>
-            <a:r>
-              <a:rPr lang="fi-FI" sz="3600" dirty="0" err="1" smtClean="0"/>
-              <a:t>Dependency</a:t>
-            </a:r>
-            <a:r>
-              <a:rPr lang="fi-FI" sz="3600" dirty="0" smtClean="0"/>
-              <a:t> Analysis </a:t>
-            </a:r>
-            <a:r>
-              <a:rPr lang="fi-FI" sz="3600" dirty="0" err="1" smtClean="0"/>
-              <a:t>Tool</a:t>
-            </a:r>
-            <a:r>
-              <a:rPr lang="fi-FI" sz="3600" dirty="0" smtClean="0"/>
-              <a:t>: </a:t>
-            </a:r>
-            <a:r>
-              <a:rPr lang="fi-FI" sz="3600" dirty="0" err="1" smtClean="0"/>
-              <a:t>Features</a:t>
-            </a:r>
-            <a:endParaRPr lang="en-US" sz="3600" dirty="0"/>
-          </a:p>
-        </p:txBody>
-      </p:sp>
-      <p:sp>
-        <p:nvSpPr>
-          <p:cNvPr id="6" name="Content Placeholder 5"/>
-          <p:cNvSpPr>
-            <a:spLocks noGrp="1"/>
-          </p:cNvSpPr>
-          <p:nvPr>
-            <p:ph idx="1"/>
-          </p:nvPr>
-        </p:nvSpPr>
-        <p:spPr/>
-        <p:txBody>
-          <a:bodyPr>
-            <a:normAutofit lnSpcReduction="10000"/>
-          </a:bodyPr>
-          <a:lstStyle/>
-          <a:p>
-            <a:r>
-              <a:rPr lang="en-US" dirty="0"/>
-              <a:t>Choosing and Managing Source Directories</a:t>
-            </a:r>
-          </a:p>
-          <a:p>
-            <a:r>
-              <a:rPr lang="en-US" dirty="0"/>
-              <a:t>Running Dependency Analysis</a:t>
-            </a:r>
-          </a:p>
-          <a:p>
-            <a:r>
-              <a:rPr lang="en-US" dirty="0"/>
-              <a:t>Manual Connections</a:t>
-            </a:r>
-          </a:p>
-          <a:p>
-            <a:r>
-              <a:rPr lang="en-US" dirty="0"/>
-              <a:t>Editing Existing Connections</a:t>
-            </a:r>
-          </a:p>
-          <a:p>
-            <a:r>
-              <a:rPr lang="en-US" dirty="0"/>
-              <a:t>Filtering Connections</a:t>
-            </a:r>
-          </a:p>
-          <a:p>
-            <a:r>
-              <a:rPr lang="en-US" dirty="0"/>
-              <a:t>External Dependencies</a:t>
-            </a:r>
-          </a:p>
-          <a:p>
-            <a:r>
-              <a:rPr lang="en-US" dirty="0"/>
-              <a:t>Settings</a:t>
-            </a:r>
-          </a:p>
-        </p:txBody>
-      </p:sp>
-      <p:sp>
-        <p:nvSpPr>
-          <p:cNvPr id="4" name="Slide Number Placeholder 3"/>
-          <p:cNvSpPr>
-            <a:spLocks noGrp="1"/>
-          </p:cNvSpPr>
-          <p:nvPr>
-            <p:ph type="sldNum" sz="quarter" idx="11"/>
-          </p:nvPr>
-        </p:nvSpPr>
-        <p:spPr/>
-        <p:txBody>
-          <a:bodyPr/>
-          <a:lstStyle/>
-          <a:p>
-            <a:fld id="{396A2528-BFCE-4DA1-8CA6-E7CCE78C7A79}" type="slidenum">
-              <a:rPr lang="fi-FI" smtClean="0"/>
-              <a:pPr/>
-              <a:t>7</a:t>
-            </a:fld>
-            <a:endParaRPr lang="fi-FI" dirty="0"/>
-          </a:p>
-        </p:txBody>
-      </p:sp>
-    </p:spTree>
-    <p:extLst>
-      <p:ext uri="{BB962C8B-B14F-4D97-AF65-F5344CB8AC3E}">
-        <p14:creationId xmlns:p14="http://schemas.microsoft.com/office/powerpoint/2010/main" val="1194647921"/>
       </p:ext>
     </p:extLst>
   </p:cSld>

</xml_diff>

<commit_message>
Updated the presentation slides and made a pdf version.
</commit_message>
<xml_diff>
--- a/Administrative/Project Plan Slides.pptx
+++ b/Administrative/Project Plan Slides.pptx
@@ -6326,12 +6326,33 @@
         </p:nvSpPr>
         <p:spPr/>
         <p:txBody>
-          <a:bodyPr/>
+          <a:bodyPr>
+            <a:normAutofit/>
+          </a:bodyPr>
           <a:lstStyle/>
           <a:p>
             <a:r>
+              <a:rPr lang="fi-FI" dirty="0" err="1"/>
+              <a:t>Implemented</a:t>
+            </a:r>
+            <a:r>
+              <a:rPr lang="fi-FI" dirty="0"/>
+              <a:t> in C++ and </a:t>
+            </a:r>
+            <a:r>
+              <a:rPr lang="fi-FI" dirty="0" err="1"/>
+              <a:t>Qt</a:t>
+            </a:r>
+            <a:endParaRPr lang="en-US" dirty="0"/>
+          </a:p>
+          <a:p>
+            <a:r>
+              <a:rPr lang="en-US" dirty="0" smtClean="0"/>
+              <a:t>Kactus2 </a:t>
+            </a:r>
+            <a:r>
               <a:rPr lang="en-US" dirty="0"/>
-              <a:t>Kactus2 goals</a:t>
+              <a:t>goals</a:t>
             </a:r>
           </a:p>
           <a:p>
@@ -6357,8 +6378,12 @@
           </a:p>
           <a:p>
             <a:r>
+              <a:rPr lang="en-US" dirty="0" smtClean="0"/>
+              <a:t>Handling </a:t>
+            </a:r>
+            <a:r>
               <a:rPr lang="en-US" dirty="0"/>
-              <a:t>Handling file dependencies is essential for good usability</a:t>
+              <a:t>file dependencies is essential for good usability</a:t>
             </a:r>
           </a:p>
         </p:txBody>

</xml_diff>